<commit_message>
update slides and demos with Partner Center SDK GA updates
</commit_message>
<xml_diff>
--- a/mod-02-azuread/mod-02-azuread.pptx
+++ b/mod-02-azuread/mod-02-azuread.pptx
@@ -2772,7 +2772,7 @@
               <a:rPr lang="en-US" smtClean="0">
                 <a:latin typeface="Segoe UI" pitchFamily="34" charset="0"/>
               </a:rPr>
-              <a:t>3/14/2016 3:14 PM</a:t>
+              <a:t>3/17/2016 4:31 PM</a:t>
             </a:fld>
             <a:endParaRPr lang="en-US" dirty="0">
               <a:latin typeface="Segoe UI" pitchFamily="34" charset="0"/>
@@ -3069,7 +3069,7 @@
           <a:p>
             <a:fld id="{38EEC551-8CDA-4EB6-89BB-2A86C9F091C8}" type="datetime8">
               <a:rPr lang="en-US" smtClean="0"/>
-              <a:t>3/14/2016 3:14 PM</a:t>
+              <a:t>3/17/2016 4:31 PM</a:t>
             </a:fld>
             <a:endParaRPr lang="en-US" dirty="0"/>
           </a:p>
@@ -3457,7 +3457,7 @@
           <a:p>
             <a:fld id="{38EEC551-8CDA-4EB6-89BB-2A86C9F091C8}" type="datetime8">
               <a:rPr lang="en-US" smtClean="0"/>
-              <a:t>3/14/2016 3:14 PM</a:t>
+              <a:t>3/17/2016 4:31 PM</a:t>
             </a:fld>
             <a:endParaRPr lang="en-US" dirty="0"/>
           </a:p>
@@ -3607,7 +3607,7 @@
                   <a:prstClr val="black"/>
                 </a:solidFill>
               </a:rPr>
-              <a:t>3/14/2016 3:14 PM</a:t>
+              <a:t>3/17/2016 4:31 PM</a:t>
             </a:fld>
             <a:endParaRPr lang="en-US" dirty="0">
               <a:solidFill>
@@ -3822,7 +3822,7 @@
           <a:p>
             <a:fld id="{90EC29EE-A8AD-4CE0-9C0B-116E0D4D7533}" type="datetime8">
               <a:rPr lang="en-US" smtClean="0"/>
-              <a:t>3/14/2016 3:14 PM</a:t>
+              <a:t>3/17/2016 4:31 PM</a:t>
             </a:fld>
             <a:endParaRPr lang="en-US" dirty="0"/>
           </a:p>
@@ -3987,7 +3987,7 @@
           <a:p>
             <a:fld id="{7D10C09F-FCA1-48C8-B40D-42E1045D109E}" type="datetime8">
               <a:rPr lang="en-US" smtClean="0"/>
-              <a:t>3/14/2016 3:14 PM</a:t>
+              <a:t>3/17/2016 4:31 PM</a:t>
             </a:fld>
             <a:endParaRPr lang="en-US" dirty="0"/>
           </a:p>
@@ -4172,7 +4172,7 @@
           <a:p>
             <a:fld id="{38EEC551-8CDA-4EB6-89BB-2A86C9F091C8}" type="datetime8">
               <a:rPr lang="en-US" smtClean="0"/>
-              <a:t>3/14/2016 3:14 PM</a:t>
+              <a:t>3/17/2016 4:31 PM</a:t>
             </a:fld>
             <a:endParaRPr lang="en-US" dirty="0"/>
           </a:p>
@@ -4425,7 +4425,7 @@
           <a:p>
             <a:fld id="{7D10C09F-FCA1-48C8-B40D-42E1045D109E}" type="datetime8">
               <a:rPr lang="en-US" smtClean="0"/>
-              <a:t>3/14/2016 3:14 PM</a:t>
+              <a:t>3/17/2016 4:31 PM</a:t>
             </a:fld>
             <a:endParaRPr lang="en-US" dirty="0"/>
           </a:p>
@@ -4610,7 +4610,7 @@
           <a:p>
             <a:fld id="{38EEC551-8CDA-4EB6-89BB-2A86C9F091C8}" type="datetime8">
               <a:rPr lang="en-US" smtClean="0"/>
-              <a:t>3/14/2016 3:14 PM</a:t>
+              <a:t>3/17/2016 4:31 PM</a:t>
             </a:fld>
             <a:endParaRPr lang="en-US" dirty="0"/>
           </a:p>
@@ -4795,7 +4795,7 @@
           <a:p>
             <a:fld id="{38EEC551-8CDA-4EB6-89BB-2A86C9F091C8}" type="datetime8">
               <a:rPr lang="en-US" smtClean="0"/>
-              <a:t>3/14/2016 3:14 PM</a:t>
+              <a:t>3/17/2016 4:31 PM</a:t>
             </a:fld>
             <a:endParaRPr lang="en-US" dirty="0"/>
           </a:p>
@@ -4960,7 +4960,7 @@
           <a:p>
             <a:fld id="{90EC29EE-A8AD-4CE0-9C0B-116E0D4D7533}" type="datetime8">
               <a:rPr lang="en-US" smtClean="0"/>
-              <a:t>3/14/2016 3:14 PM</a:t>
+              <a:t>3/17/2016 4:31 PM</a:t>
             </a:fld>
             <a:endParaRPr lang="en-US" dirty="0"/>
           </a:p>
@@ -28346,14 +28346,14 @@
                 <a:latin typeface="Consolas" panose="020B0609020204030204" pitchFamily="49" charset="0"/>
                 <a:cs typeface="Consolas" panose="020B0609020204030204" pitchFamily="49" charset="0"/>
               </a:rPr>
-              <a:t>1. Request token (Client Id, Username, Password, resource=“https://</a:t>
-            </a:r>
-            <a:r>
-              <a:rPr lang="en-US" sz="1400" dirty="0" err="1" smtClean="0">
+              <a:t>1. Request token (Client Id, Username, Password, resource=“https</a:t>
+            </a:r>
+            <a:r>
+              <a:rPr lang="en-US" sz="1400" dirty="0" smtClean="0">
                 <a:latin typeface="Consolas" panose="020B0609020204030204" pitchFamily="49" charset="0"/>
                 <a:cs typeface="Consolas" panose="020B0609020204030204" pitchFamily="49" charset="0"/>
               </a:rPr>
-              <a:t>partnerapi.store.microsoft.com</a:t>
+              <a:t>://api.partnercenter.microsoft.com</a:t>
             </a:r>
             <a:r>
               <a:rPr lang="en-US" sz="1400" dirty="0" smtClean="0">
@@ -29493,14 +29493,14 @@
                 <a:latin typeface="Consolas" panose="020B0609020204030204" pitchFamily="49" charset="0"/>
                 <a:cs typeface="Consolas" panose="020B0609020204030204" pitchFamily="49" charset="0"/>
               </a:rPr>
-              <a:t>1. Request token (Client Id, Client Credential, resource=“https://</a:t>
-            </a:r>
-            <a:r>
-              <a:rPr lang="en-US" sz="1400" dirty="0" err="1" smtClean="0">
+              <a:t>1. Request token (Client Id, Client Credential, resource=“https</a:t>
+            </a:r>
+            <a:r>
+              <a:rPr lang="en-US" sz="1400" dirty="0">
                 <a:latin typeface="Consolas" panose="020B0609020204030204" pitchFamily="49" charset="0"/>
                 <a:cs typeface="Consolas" panose="020B0609020204030204" pitchFamily="49" charset="0"/>
               </a:rPr>
-              <a:t>partnerapi.store.microsoft.com</a:t>
+              <a:t>://api.partnercenter.microsoft.com</a:t>
             </a:r>
             <a:r>
               <a:rPr lang="en-US" sz="1400" dirty="0" smtClean="0">
@@ -31632,14 +31632,14 @@
                 <a:latin typeface="Consolas" panose="020B0609020204030204" pitchFamily="49" charset="0"/>
                 <a:cs typeface="Consolas" panose="020B0609020204030204" pitchFamily="49" charset="0"/>
               </a:rPr>
-              <a:t>6. Redeem Auth Code (Auth Code, Client ID, Client Credential, Redirect URI, resource=“https://</a:t>
-            </a:r>
-            <a:r>
-              <a:rPr lang="en-US" sz="1400" dirty="0" err="1" smtClean="0">
+              <a:t>6. Redeem Auth Code (Auth Code, Client ID, Client Credential, Redirect URI, resource=“https</a:t>
+            </a:r>
+            <a:r>
+              <a:rPr lang="en-US" sz="1400" dirty="0">
                 <a:latin typeface="Consolas" panose="020B0609020204030204" pitchFamily="49" charset="0"/>
                 <a:cs typeface="Consolas" panose="020B0609020204030204" pitchFamily="49" charset="0"/>
               </a:rPr>
-              <a:t>partnerapi.store.microsoft.com</a:t>
+              <a:t>://api.partnercenter.microsoft.com</a:t>
             </a:r>
             <a:r>
               <a:rPr lang="en-US" sz="1400" dirty="0" smtClean="0">
@@ -32675,14 +32675,14 @@
                 <a:latin typeface="Consolas" panose="020B0609020204030204" pitchFamily="49" charset="0"/>
                 <a:cs typeface="Consolas" panose="020B0609020204030204" pitchFamily="49" charset="0"/>
               </a:rPr>
-              <a:t>1. Request token (Client Id, resource=“https://</a:t>
-            </a:r>
-            <a:r>
-              <a:rPr lang="en-US" sz="1400" dirty="0" err="1" smtClean="0">
+              <a:t>1. Request token (Client Id, resource=“https</a:t>
+            </a:r>
+            <a:r>
+              <a:rPr lang="en-US" sz="1400" dirty="0">
                 <a:latin typeface="Consolas" panose="020B0609020204030204" pitchFamily="49" charset="0"/>
                 <a:cs typeface="Consolas" panose="020B0609020204030204" pitchFamily="49" charset="0"/>
               </a:rPr>
-              <a:t>partnerapi.store.microsoft.com</a:t>
+              <a:t>://api.partnercenter.microsoft.com</a:t>
             </a:r>
             <a:r>
               <a:rPr lang="en-US" sz="1400" dirty="0" smtClean="0">
@@ -33556,14 +33556,14 @@
                 <a:latin typeface="Consolas" panose="020B0609020204030204" pitchFamily="49" charset="0"/>
                 <a:cs typeface="Consolas" panose="020B0609020204030204" pitchFamily="49" charset="0"/>
               </a:rPr>
-              <a:t>. Redeem Auth Code (Auth Code, Client ID, Redirect URI, resource=“https://</a:t>
-            </a:r>
-            <a:r>
-              <a:rPr lang="en-US" sz="1400" dirty="0" err="1" smtClean="0">
+              <a:t>. Redeem Auth Code (Auth Code, Client ID, Redirect URI, resource=“https</a:t>
+            </a:r>
+            <a:r>
+              <a:rPr lang="en-US" sz="1400" dirty="0">
                 <a:latin typeface="Consolas" panose="020B0609020204030204" pitchFamily="49" charset="0"/>
                 <a:cs typeface="Consolas" panose="020B0609020204030204" pitchFamily="49" charset="0"/>
               </a:rPr>
-              <a:t>partnerapi.store.microsoft.com</a:t>
+              <a:t>://api.partnercenter.microsoft.com</a:t>
             </a:r>
             <a:r>
               <a:rPr lang="en-US" sz="1400" dirty="0" smtClean="0">
@@ -36228,15 +36228,6 @@
 </file>
 
 <file path=customXml/item1.xml><?xml version="1.0" encoding="utf-8"?>
-<?mso-contentType ?>
-<FormTemplates xmlns="http://schemas.microsoft.com/sharepoint/v3/contenttype/forms">
-  <Display>DocumentLibraryForm</Display>
-  <Edit>DocumentLibraryForm</Edit>
-  <New>DocumentLibraryForm</New>
-</FormTemplates>
-</file>
-
-<file path=customXml/item2.xml><?xml version="1.0" encoding="utf-8"?>
 <p:properties xmlns:p="http://schemas.microsoft.com/office/2006/metadata/properties" xmlns:xsi="http://www.w3.org/2001/XMLSchema-instance" xmlns:pc="http://schemas.microsoft.com/office/infopath/2007/PartnerControls">
   <documentManagement>
     <h9a868b2ee15488883f623ae5237ecae xmlns="12a172fe-0250-434a-85cf-03b10810c5e5">
@@ -36311,6 +36302,15 @@
     </eb9cf3a3af7b473faa5c9c98148a90a4>
   </documentManagement>
 </p:properties>
+</file>
+
+<file path=customXml/item2.xml><?xml version="1.0" encoding="utf-8"?>
+<?mso-contentType ?>
+<FormTemplates xmlns="http://schemas.microsoft.com/sharepoint/v3/contenttype/forms">
+  <Display>DocumentLibraryForm</Display>
+  <Edit>DocumentLibraryForm</Edit>
+  <New>DocumentLibraryForm</New>
+</FormTemplates>
 </file>
 
 <file path=customXml/item3.xml><?xml version="1.0" encoding="utf-8"?>
@@ -36624,14 +36624,6 @@
 </file>
 
 <file path=customXml/itemProps1.xml><?xml version="1.0" encoding="utf-8"?>
-<ds:datastoreItem xmlns:ds="http://schemas.openxmlformats.org/officeDocument/2006/customXml" ds:itemID="{758FDAC0-319D-4A54-8D8E-1D42CB1F8004}">
-  <ds:schemaRefs>
-    <ds:schemaRef ds:uri="http://schemas.microsoft.com/sharepoint/v3/contenttype/forms"/>
-  </ds:schemaRefs>
-</ds:datastoreItem>
-</file>
-
-<file path=customXml/itemProps2.xml><?xml version="1.0" encoding="utf-8"?>
 <ds:datastoreItem xmlns:ds="http://schemas.openxmlformats.org/officeDocument/2006/customXml" ds:itemID="{F990F116-B58F-4255-B05B-DA3808E0E5C6}">
   <ds:schemaRefs>
     <ds:schemaRef ds:uri="http://schemas.microsoft.com/office/2006/metadata/properties"/>
@@ -36645,6 +36637,14 @@
     <ds:schemaRef ds:uri="http://schemas.microsoft.com/office/infopath/2007/PartnerControls"/>
     <ds:schemaRef ds:uri="12a172fe-0250-434a-85cf-03b10810c5e5"/>
     <ds:schemaRef ds:uri="http://www.w3.org/XML/1998/namespace"/>
+  </ds:schemaRefs>
+</ds:datastoreItem>
+</file>
+
+<file path=customXml/itemProps2.xml><?xml version="1.0" encoding="utf-8"?>
+<ds:datastoreItem xmlns:ds="http://schemas.openxmlformats.org/officeDocument/2006/customXml" ds:itemID="{758FDAC0-319D-4A54-8D8E-1D42CB1F8004}">
+  <ds:schemaRefs>
+    <ds:schemaRef ds:uri="http://schemas.microsoft.com/sharepoint/v3/contenttype/forms"/>
   </ds:schemaRefs>
 </ds:datastoreItem>
 </file>

</xml_diff>